<commit_message>
Fixed picture positions on some slides. Updated App theme for widgets to new look.
</commit_message>
<xml_diff>
--- a/android/activity/explicit/activityswitchexp/doc/slides.pptx
+++ b/android/activity/explicit/activityswitchexp/doc/slides.pptx
@@ -113,6 +113,11 @@
       </a:defRPr>
     </a:lvl9pPr>
   </p:defaultTextStyle>
+  <p:extLst>
+    <p:ext uri="{EFAFB233-063F-42B5-8137-9DF3F51BA10A}">
+      <p15:sldGuideLst xmlns:p15="http://schemas.microsoft.com/office/powerpoint/2012/main"/>
+    </p:ext>
+  </p:extLst>
 </p:presentation>
 </file>
 
@@ -198,7 +203,7 @@
           <a:p>
             <a:fld id="{4A17118F-E7C8-4869-AF87-A2719E2613E5}" type="datetimeFigureOut">
               <a:rPr lang="en-US" smtClean="0"/>
-              <a:t>7/30/2015</a:t>
+              <a:t>8/9/2015</a:t>
             </a:fld>
             <a:endParaRPr lang="en-US"/>
           </a:p>
@@ -4039,7 +4044,7 @@
         </p:nvSpPr>
         <p:spPr>
           <a:xfrm>
-            <a:off x="838200" y="365126"/>
+            <a:off x="572091" y="182562"/>
             <a:ext cx="10515600" cy="697320"/>
           </a:xfrm>
         </p:spPr>
@@ -4154,8 +4159,8 @@
         </p:blipFill>
         <p:spPr>
           <a:xfrm>
-            <a:off x="1606867" y="1062446"/>
-            <a:ext cx="3857625" cy="5328534"/>
+            <a:off x="1828800" y="1097280"/>
+            <a:ext cx="3971913" cy="5486400"/>
           </a:xfrm>
           <a:prstGeom prst="rect">
             <a:avLst/>
@@ -4184,8 +4189,8 @@
         </p:blipFill>
         <p:spPr>
           <a:xfrm>
-            <a:off x="6398251" y="1062446"/>
-            <a:ext cx="3857625" cy="5328534"/>
+            <a:off x="6400800" y="1097280"/>
+            <a:ext cx="3971913" cy="5486400"/>
           </a:xfrm>
           <a:prstGeom prst="rect">
             <a:avLst/>
@@ -4234,7 +4239,7 @@
         </p:nvSpPr>
         <p:spPr>
           <a:xfrm>
-            <a:off x="838200" y="365126"/>
+            <a:off x="1320237" y="326831"/>
             <a:ext cx="10515600" cy="566691"/>
           </a:xfrm>
         </p:spPr>
@@ -4346,8 +4351,8 @@
         </p:blipFill>
         <p:spPr>
           <a:xfrm>
-            <a:off x="1598158" y="931817"/>
-            <a:ext cx="3857625" cy="5459163"/>
+            <a:off x="1828800" y="1097280"/>
+            <a:ext cx="3876872" cy="5486400"/>
           </a:xfrm>
           <a:prstGeom prst="rect">
             <a:avLst/>
@@ -4376,8 +4381,8 @@
         </p:blipFill>
         <p:spPr>
           <a:xfrm>
-            <a:off x="6211017" y="931817"/>
-            <a:ext cx="3857625" cy="5459163"/>
+            <a:off x="6400799" y="1097279"/>
+            <a:ext cx="3876872" cy="5486400"/>
           </a:xfrm>
           <a:prstGeom prst="rect">
             <a:avLst/>

</xml_diff>